<commit_message>
added Week 6 lab materials
</commit_message>
<xml_diff>
--- a/Week 6 -- 2D spatial models/Lecture/Lecture 6 -- 2D spatial models.pptx
+++ b/Week 6 -- 2D spatial models/Lecture/Lecture 6 -- 2D spatial models.pptx
@@ -3819,7 +3819,7 @@
           <a:graphicData uri="http://schemas.openxmlformats.org/presentationml/2006/ole">
             <mc:AlternateContent xmlns:mc="http://schemas.openxmlformats.org/markup-compatibility/2006">
               <mc:Choice xmlns:v="urn:schemas-microsoft-com:vml" Requires="v">
-                <p:oleObj spid="_x0000_s8209" name="Equation" r:id="rId4" imgW="1549080" imgH="736560" progId="Equation.DSMT4">
+                <p:oleObj spid="_x0000_s8212" name="Equation" r:id="rId4" imgW="1549080" imgH="736560" progId="Equation.DSMT4">
                   <p:embed/>
                 </p:oleObj>
               </mc:Choice>
@@ -3864,6 +3864,13 @@
   <p:clrMapOvr>
     <a:masterClrMapping/>
   </p:clrMapOvr>
+  <p:timing>
+    <p:tnLst>
+      <p:par>
+        <p:cTn id="1" dur="indefinite" restart="never" nodeType="tmRoot"/>
+      </p:par>
+    </p:tnLst>
+  </p:timing>
 </p:sld>
 </file>
 
@@ -4108,7 +4115,7 @@
           <a:graphicData uri="http://schemas.openxmlformats.org/presentationml/2006/ole">
             <mc:AlternateContent xmlns:mc="http://schemas.openxmlformats.org/markup-compatibility/2006">
               <mc:Choice xmlns:v="urn:schemas-microsoft-com:vml" Requires="v">
-                <p:oleObj spid="_x0000_s9233" name="Equation" r:id="rId4" imgW="4406760" imgH="2260440" progId="Equation.DSMT4">
+                <p:oleObj spid="_x0000_s9236" name="Equation" r:id="rId4" imgW="4406760" imgH="2260440" progId="Equation.DSMT4">
                   <p:embed/>
                 </p:oleObj>
               </mc:Choice>
@@ -5269,7 +5276,7 @@
           <a:graphicData uri="http://schemas.openxmlformats.org/presentationml/2006/ole">
             <mc:AlternateContent xmlns:mc="http://schemas.openxmlformats.org/markup-compatibility/2006">
               <mc:Choice xmlns:v="urn:schemas-microsoft-com:vml" Requires="v">
-                <p:oleObj spid="_x0000_s10270" name="Equation" r:id="rId4" imgW="6730920" imgH="2260440" progId="Equation.DSMT4">
+                <p:oleObj spid="_x0000_s10276" name="Equation" r:id="rId4" imgW="6730920" imgH="2260440" progId="Equation.DSMT4">
                   <p:embed/>
                 </p:oleObj>
               </mc:Choice>
@@ -5326,7 +5333,7 @@
           <a:graphicData uri="http://schemas.openxmlformats.org/presentationml/2006/ole">
             <mc:AlternateContent xmlns:mc="http://schemas.openxmlformats.org/markup-compatibility/2006">
               <mc:Choice xmlns:v="urn:schemas-microsoft-com:vml" Requires="v">
-                <p:oleObj spid="_x0000_s10271" name="Equation" r:id="rId6" imgW="2133360" imgH="736560" progId="Equation.DSMT4">
+                <p:oleObj spid="_x0000_s10277" name="Equation" r:id="rId6" imgW="2133360" imgH="736560" progId="Equation.DSMT4">
                   <p:embed/>
                 </p:oleObj>
               </mc:Choice>
@@ -6201,6 +6208,13 @@
   <p:clrMapOvr>
     <a:masterClrMapping/>
   </p:clrMapOvr>
+  <p:timing>
+    <p:tnLst>
+      <p:par>
+        <p:cTn id="1" dur="indefinite" restart="never" nodeType="tmRoot"/>
+      </p:par>
+    </p:tnLst>
+  </p:timing>
 </p:sld>
 </file>
 
@@ -6288,8 +6302,9 @@
           <a:p>
             <a:r>
               <a:rPr lang="en-US" dirty="0" smtClean="0"/>
-              <a:t>SEPERABLE</a:t>
-            </a:r>
+              <a:t>SEPARABLE</a:t>
+            </a:r>
+            <a:endParaRPr lang="en-US" dirty="0" smtClean="0"/>
           </a:p>
           <a:p>
             <a:pPr lvl="1"/>
@@ -6326,6 +6341,13 @@
   <p:clrMapOvr>
     <a:masterClrMapping/>
   </p:clrMapOvr>
+  <p:timing>
+    <p:tnLst>
+      <p:par>
+        <p:cTn id="1" dur="indefinite" restart="never" nodeType="tmRoot"/>
+      </p:par>
+    </p:tnLst>
+  </p:timing>
 </p:sld>
 </file>
 
@@ -6365,48 +6387,245 @@
           </a:p>
         </p:txBody>
       </p:sp>
-      <p:sp>
-        <p:nvSpPr>
-          <p:cNvPr id="3" name="Content Placeholder 2"/>
-          <p:cNvSpPr>
-            <a:spLocks noGrp="1"/>
-          </p:cNvSpPr>
-          <p:nvPr>
-            <p:ph idx="1"/>
-          </p:nvPr>
-        </p:nvSpPr>
-        <p:spPr/>
-        <p:txBody>
-          <a:bodyPr/>
-          <a:lstStyle/>
-          <a:p>
-            <a:pPr marL="0" indent="0">
-              <a:buNone/>
-            </a:pPr>
-            <a:r>
-              <a:rPr lang="en-US" dirty="0" smtClean="0"/>
-              <a:t>Modify code to avoid using </a:t>
-            </a:r>
-            <a:r>
-              <a:rPr lang="en-US" dirty="0" err="1" smtClean="0"/>
-              <a:t>Rmgauss</a:t>
-            </a:r>
-            <a:endParaRPr lang="en-US" dirty="0" smtClean="0"/>
-          </a:p>
-          <a:p>
-            <a:pPr lvl="1"/>
-            <a:r>
-              <a:rPr lang="en-US" dirty="0" smtClean="0"/>
-              <a:t>How to </a:t>
-            </a:r>
-            <a:r>
-              <a:rPr lang="en-US" smtClean="0"/>
-              <a:t>do this?</a:t>
-            </a:r>
-            <a:endParaRPr lang="en-GB" dirty="0"/>
-          </a:p>
-        </p:txBody>
-      </p:sp>
+      <mc:AlternateContent xmlns:mc="http://schemas.openxmlformats.org/markup-compatibility/2006">
+        <mc:Choice xmlns:a14="http://schemas.microsoft.com/office/drawing/2010/main" Requires="a14">
+          <p:sp>
+            <p:nvSpPr>
+              <p:cNvPr id="3" name="Content Placeholder 2"/>
+              <p:cNvSpPr>
+                <a:spLocks noGrp="1"/>
+              </p:cNvSpPr>
+              <p:nvPr>
+                <p:ph idx="1"/>
+              </p:nvPr>
+            </p:nvSpPr>
+            <p:spPr/>
+            <p:txBody>
+              <a:bodyPr/>
+              <a:lstStyle/>
+              <a:p>
+                <a:pPr marL="0" indent="0">
+                  <a:buNone/>
+                </a:pPr>
+                <a:r>
+                  <a:rPr lang="en-US" dirty="0" smtClean="0"/>
+                  <a:t>Modify code to avoid using </a:t>
+                </a:r>
+                <a:r>
+                  <a:rPr lang="en-US" dirty="0" err="1" smtClean="0"/>
+                  <a:t>RFgauss</a:t>
+                </a:r>
+                <a:endParaRPr lang="en-US" dirty="0" smtClean="0"/>
+              </a:p>
+              <a:p>
+                <a:pPr lvl="1"/>
+                <a:r>
+                  <a:rPr lang="en-US" dirty="0" smtClean="0"/>
+                  <a:t>How to do this</a:t>
+                </a:r>
+                <a:r>
+                  <a:rPr lang="en-US" dirty="0" smtClean="0"/>
+                  <a:t>?</a:t>
+                </a:r>
+              </a:p>
+              <a:p>
+                <a:pPr lvl="1"/>
+                <a:endParaRPr lang="en-US" dirty="0"/>
+              </a:p>
+              <a:p>
+                <a:pPr marL="0" indent="0">
+                  <a:buNone/>
+                </a:pPr>
+                <a:r>
+                  <a:rPr lang="en-US" dirty="0" smtClean="0"/>
+                  <a:t>Modify to have dynamics over time</a:t>
+                </a:r>
+              </a:p>
+              <a:p>
+                <a:pPr marL="0" indent="0">
+                  <a:buNone/>
+                </a:pPr>
+                <a14:m>
+                  <m:oMathPara xmlns:m="http://schemas.openxmlformats.org/officeDocument/2006/math">
+                    <m:oMathParaPr>
+                      <m:jc m:val="centerGroup"/>
+                    </m:oMathParaPr>
+                    <m:oMath xmlns:m="http://schemas.openxmlformats.org/officeDocument/2006/math">
+                      <m:sSub>
+                        <m:sSubPr>
+                          <m:ctrlPr>
+                            <a:rPr lang="en-US" b="0" i="1" smtClean="0">
+                              <a:latin typeface="Cambria Math" panose="02040503050406030204" pitchFamily="18" charset="0"/>
+                            </a:rPr>
+                          </m:ctrlPr>
+                        </m:sSubPr>
+                        <m:e>
+                          <m:r>
+                            <a:rPr lang="en-US" b="1" i="0" smtClean="0">
+                              <a:latin typeface="Cambria Math" panose="02040503050406030204" pitchFamily="18" charset="0"/>
+                            </a:rPr>
+                            <m:t>𝐝</m:t>
+                          </m:r>
+                        </m:e>
+                        <m:sub>
+                          <m:r>
+                            <a:rPr lang="en-US" b="0" i="1" smtClean="0">
+                              <a:latin typeface="Cambria Math" panose="02040503050406030204" pitchFamily="18" charset="0"/>
+                            </a:rPr>
+                            <m:t>𝑡</m:t>
+                          </m:r>
+                          <m:r>
+                            <a:rPr lang="en-US" b="0" i="1" smtClean="0">
+                              <a:latin typeface="Cambria Math" panose="02040503050406030204" pitchFamily="18" charset="0"/>
+                            </a:rPr>
+                            <m:t>+1</m:t>
+                          </m:r>
+                        </m:sub>
+                      </m:sSub>
+                      <m:r>
+                        <a:rPr lang="en-US" b="0" i="1" smtClean="0">
+                          <a:latin typeface="Cambria Math" panose="02040503050406030204" pitchFamily="18" charset="0"/>
+                        </a:rPr>
+                        <m:t>~</m:t>
+                      </m:r>
+                      <m:r>
+                        <a:rPr lang="en-US" b="0" i="1" smtClean="0">
+                          <a:latin typeface="Cambria Math" panose="02040503050406030204" pitchFamily="18" charset="0"/>
+                        </a:rPr>
+                        <m:t>𝑀𝑉𝑁</m:t>
+                      </m:r>
+                      <m:r>
+                        <a:rPr lang="en-US" b="0" i="1" smtClean="0">
+                          <a:latin typeface="Cambria Math" panose="02040503050406030204" pitchFamily="18" charset="0"/>
+                        </a:rPr>
+                        <m:t>(</m:t>
+                      </m:r>
+                      <m:r>
+                        <a:rPr lang="en-US" b="0" i="1" smtClean="0">
+                          <a:latin typeface="Cambria Math" panose="02040503050406030204" pitchFamily="18" charset="0"/>
+                        </a:rPr>
+                        <m:t>𝑠</m:t>
+                      </m:r>
+                      <m:r>
+                        <a:rPr lang="en-US" b="0" i="1" smtClean="0">
+                          <a:latin typeface="Cambria Math" panose="02040503050406030204" pitchFamily="18" charset="0"/>
+                          <a:ea typeface="Cambria Math" panose="02040503050406030204" pitchFamily="18" charset="0"/>
+                        </a:rPr>
+                        <m:t>×</m:t>
+                      </m:r>
+                      <m:sSub>
+                        <m:sSubPr>
+                          <m:ctrlPr>
+                            <a:rPr lang="en-US" b="0" i="1" smtClean="0">
+                              <a:latin typeface="Cambria Math" panose="02040503050406030204" pitchFamily="18" charset="0"/>
+                              <a:ea typeface="Cambria Math" panose="02040503050406030204" pitchFamily="18" charset="0"/>
+                            </a:rPr>
+                          </m:ctrlPr>
+                        </m:sSubPr>
+                        <m:e>
+                          <m:r>
+                            <a:rPr lang="en-US" b="1" i="0" smtClean="0">
+                              <a:latin typeface="Cambria Math" panose="02040503050406030204" pitchFamily="18" charset="0"/>
+                              <a:ea typeface="Cambria Math" panose="02040503050406030204" pitchFamily="18" charset="0"/>
+                            </a:rPr>
+                            <m:t>𝐝</m:t>
+                          </m:r>
+                        </m:e>
+                        <m:sub>
+                          <m:r>
+                            <a:rPr lang="en-US" b="0" i="1" smtClean="0">
+                              <a:latin typeface="Cambria Math" panose="02040503050406030204" pitchFamily="18" charset="0"/>
+                              <a:ea typeface="Cambria Math" panose="02040503050406030204" pitchFamily="18" charset="0"/>
+                            </a:rPr>
+                            <m:t>𝑡</m:t>
+                          </m:r>
+                        </m:sub>
+                      </m:sSub>
+                      <m:r>
+                        <a:rPr lang="en-US" b="0" i="1" smtClean="0">
+                          <a:latin typeface="Cambria Math" panose="02040503050406030204" pitchFamily="18" charset="0"/>
+                          <a:ea typeface="Cambria Math" panose="02040503050406030204" pitchFamily="18" charset="0"/>
+                        </a:rPr>
+                        <m:t>,</m:t>
+                      </m:r>
+                      <m:r>
+                        <a:rPr lang="el-GR" b="1" i="0" smtClean="0">
+                          <a:latin typeface="Cambria Math" panose="02040503050406030204" pitchFamily="18" charset="0"/>
+                          <a:ea typeface="Cambria Math" panose="02040503050406030204" pitchFamily="18" charset="0"/>
+                        </a:rPr>
+                        <m:t>𝚺</m:t>
+                      </m:r>
+                      <m:r>
+                        <a:rPr lang="en-US" b="0" i="1" smtClean="0">
+                          <a:latin typeface="Cambria Math" panose="02040503050406030204" pitchFamily="18" charset="0"/>
+                          <a:ea typeface="Cambria Math" panose="02040503050406030204" pitchFamily="18" charset="0"/>
+                        </a:rPr>
+                        <m:t>)</m:t>
+                      </m:r>
+                    </m:oMath>
+                  </m:oMathPara>
+                </a14:m>
+                <a:endParaRPr lang="en-GB" dirty="0" smtClean="0"/>
+              </a:p>
+              <a:p>
+                <a:pPr lvl="1"/>
+                <a:r>
+                  <a:rPr lang="en-US" dirty="0" smtClean="0"/>
+                  <a:t>Where </a:t>
+                </a:r>
+                <a14:m>
+                  <m:oMath xmlns:m="http://schemas.openxmlformats.org/officeDocument/2006/math">
+                    <m:r>
+                      <a:rPr lang="en-US" i="1">
+                        <a:latin typeface="Cambria Math" panose="02040503050406030204" pitchFamily="18" charset="0"/>
+                      </a:rPr>
+                      <m:t>𝑠</m:t>
+                    </m:r>
+                  </m:oMath>
+                </a14:m>
+                <a:r>
+                  <a:rPr lang="en-GB" dirty="0" smtClean="0"/>
+                  <a:t> is the survival rate</a:t>
+                </a:r>
+                <a:endParaRPr lang="en-GB" dirty="0"/>
+              </a:p>
+            </p:txBody>
+          </p:sp>
+        </mc:Choice>
+        <mc:Fallback>
+          <p:sp>
+            <p:nvSpPr>
+              <p:cNvPr id="3" name="Content Placeholder 2"/>
+              <p:cNvSpPr>
+                <a:spLocks noGrp="1" noRot="1" noChangeAspect="1" noMove="1" noResize="1" noEditPoints="1" noAdjustHandles="1" noChangeArrowheads="1" noChangeShapeType="1" noTextEdit="1"/>
+              </p:cNvSpPr>
+              <p:nvPr>
+                <p:ph idx="1"/>
+              </p:nvPr>
+            </p:nvSpPr>
+            <p:spPr>
+              <a:blipFill>
+                <a:blip r:embed="rId2"/>
+                <a:stretch>
+                  <a:fillRect l="-1424" t="-1026"/>
+                </a:stretch>
+              </a:blipFill>
+            </p:spPr>
+            <p:txBody>
+              <a:bodyPr/>
+              <a:lstStyle/>
+              <a:p>
+                <a:r>
+                  <a:rPr lang="en-GB">
+                    <a:noFill/>
+                  </a:rPr>
+                  <a:t> </a:t>
+                </a:r>
+              </a:p>
+            </p:txBody>
+          </p:sp>
+        </mc:Fallback>
+      </mc:AlternateContent>
     </p:spTree>
     <p:extLst>
       <p:ext uri="{BB962C8B-B14F-4D97-AF65-F5344CB8AC3E}">
@@ -8260,6 +8479,13 @@
   <p:clrMapOvr>
     <a:masterClrMapping/>
   </p:clrMapOvr>
+  <p:timing>
+    <p:tnLst>
+      <p:par>
+        <p:cTn id="1" dur="indefinite" restart="never" nodeType="tmRoot"/>
+      </p:par>
+    </p:tnLst>
+  </p:timing>
 </p:sld>
 </file>
 
@@ -8635,7 +8861,7 @@
           <a:graphicData uri="http://schemas.openxmlformats.org/presentationml/2006/ole">
             <mc:AlternateContent xmlns:mc="http://schemas.openxmlformats.org/markup-compatibility/2006">
               <mc:Choice xmlns:v="urn:schemas-microsoft-com:vml" Requires="v">
-                <p:oleObj spid="_x0000_s7188" name="Equation" r:id="rId4" imgW="1549080" imgH="736560" progId="Equation.DSMT4">
+                <p:oleObj spid="_x0000_s7194" name="Equation" r:id="rId4" imgW="1549080" imgH="736560" progId="Equation.DSMT4">
                   <p:embed/>
                 </p:oleObj>
               </mc:Choice>
@@ -8692,7 +8918,7 @@
           <a:graphicData uri="http://schemas.openxmlformats.org/presentationml/2006/ole">
             <mc:AlternateContent xmlns:mc="http://schemas.openxmlformats.org/markup-compatibility/2006">
               <mc:Choice xmlns:v="urn:schemas-microsoft-com:vml" Requires="v">
-                <p:oleObj spid="_x0000_s7189" name="Equation" r:id="rId6" imgW="2133360" imgH="736560" progId="Equation.DSMT4">
+                <p:oleObj spid="_x0000_s7195" name="Equation" r:id="rId6" imgW="2133360" imgH="736560" progId="Equation.DSMT4">
                   <p:embed/>
                 </p:oleObj>
               </mc:Choice>
@@ -9395,6 +9621,13 @@
   <p:clrMapOvr>
     <a:masterClrMapping/>
   </p:clrMapOvr>
+  <p:timing>
+    <p:tnLst>
+      <p:par>
+        <p:cTn id="1" dur="indefinite" restart="never" nodeType="tmRoot"/>
+      </p:par>
+    </p:tnLst>
+  </p:timing>
 </p:sld>
 </file>
 

</xml_diff>